<commit_message>
- Expanded SummaryAudit tips coverage from provided slide.   - Changed Step1 logic and delete last column on MeContext table.   - Deleted some duplicated metrics and rename others in SummaryAudit.   - Updated Technical User Guides to include the Check catalog of SummaryAudit table (with tips).
</commit_message>
<xml_diff>
--- a/help/User-Guide-SSB-Retuning-Automations-v0.7.4.pptx
+++ b/help/User-Guide-SSB-Retuning-Automations-v0.7.4.pptx
@@ -10013,6 +10013,9 @@
                           </a:solidFill>
                         </a:defRPr>
                       </a:pPr>
+                      <a:r>
+                        <a:t>Need to run Step1 on these nodes</a:t>
+                      </a:r>
                     </a:p>
                   </a:txBody>
                   <a:tcPr/>
@@ -10078,7 +10081,7 @@
                         </a:defRPr>
                       </a:pPr>
                       <a:r>
-                        <a:t>NR nodes with the old N77 SSB (648672) and the new SSB (647328)</a:t>
+                        <a:t>NR nodes with with some cells missing relations to new SSB (647328)</a:t>
                       </a:r>
                     </a:p>
                   </a:txBody>
@@ -10101,7 +10104,7 @@
                         </a:defRPr>
                       </a:pPr>
                       <a:r>
-                        <a:t>Need to run Step1 on these nodes</a:t>
+                        <a:t>Nodes with any relations Step1 pending</a:t>
                       </a:r>
                     </a:p>
                   </a:txBody>
@@ -10110,6 +10113,84 @@
                       <a:srgbClr val="F2F6FC"/>
                     </a:solidFill>
                   </a:tcPr>
+                </a:tc>
+              </a:tr>
+              <a:tr h="385445">
+                <a:tc>
+                  <a:txBody>
+                    <a:bodyPr wrap="square" lIns="25400" rIns="25400" tIns="12700" bIns="12700"/>
+                    <a:lstStyle/>
+                    <a:p>
+                      <a:pPr>
+                        <a:defRPr sz="900">
+                          <a:solidFill>
+                            <a:srgbClr val="282828"/>
+                          </a:solidFill>
+                        </a:defRPr>
+                      </a:pPr>
+                      <a:r>
+                        <a:t>NRFreqRelation</a:t>
+                      </a:r>
+                    </a:p>
+                  </a:txBody>
+                  <a:tcPr/>
+                </a:tc>
+                <a:tc>
+                  <a:txBody>
+                    <a:bodyPr wrap="square" lIns="25400" rIns="25400" tIns="12700" bIns="12700"/>
+                    <a:lstStyle/>
+                    <a:p>
+                      <a:pPr>
+                        <a:defRPr sz="900">
+                          <a:solidFill>
+                            <a:srgbClr val="282828"/>
+                          </a:solidFill>
+                        </a:defRPr>
+                      </a:pPr>
+                      <a:r>
+                        <a:t>NR Frequency Audit</a:t>
+                      </a:r>
+                    </a:p>
+                  </a:txBody>
+                  <a:tcPr/>
+                </a:tc>
+                <a:tc>
+                  <a:txBody>
+                    <a:bodyPr wrap="square" lIns="25400" rIns="25400" tIns="12700" bIns="12700"/>
+                    <a:lstStyle/>
+                    <a:p>
+                      <a:pPr>
+                        <a:defRPr sz="900">
+                          <a:solidFill>
+                            <a:srgbClr val="282828"/>
+                          </a:solidFill>
+                        </a:defRPr>
+                      </a:pPr>
+                      <a:r>
+                        <a:t>NR nodes with the new N77 SSB (647328) NRFreqRelation pointing to mcpcPCellNrFreqRelProfileRef containing new SSB name (cloned) or Other</a:t>
+                      </a:r>
+                    </a:p>
+                  </a:txBody>
+                  <a:tcPr/>
+                </a:tc>
+                <a:tc>
+                  <a:txBody>
+                    <a:bodyPr wrap="square" lIns="25400" rIns="25400" tIns="12700" bIns="12700"/>
+                    <a:lstStyle/>
+                    <a:p>
+                      <a:pPr>
+                        <a:defRPr sz="900">
+                          <a:solidFill>
+                            <a:srgbClr val="282828"/>
+                          </a:solidFill>
+                        </a:defRPr>
+                      </a:pPr>
+                      <a:r>
+                        <a:t>Nodes with Step1 completed</a:t>
+                      </a:r>
+                    </a:p>
+                  </a:txBody>
+                  <a:tcPr/>
                 </a:tc>
               </a:tr>
               <a:tr h="265430">
@@ -10130,6 +10211,97 @@
                       </a:r>
                     </a:p>
                   </a:txBody>
+                  <a:tcPr>
+                    <a:solidFill>
+                      <a:srgbClr val="F2F6FC"/>
+                    </a:solidFill>
+                  </a:tcPr>
+                </a:tc>
+                <a:tc>
+                  <a:txBody>
+                    <a:bodyPr wrap="square" lIns="25400" rIns="25400" tIns="12700" bIns="12700"/>
+                    <a:lstStyle/>
+                    <a:p>
+                      <a:pPr>
+                        <a:defRPr sz="900">
+                          <a:solidFill>
+                            <a:srgbClr val="282828"/>
+                          </a:solidFill>
+                        </a:defRPr>
+                      </a:pPr>
+                      <a:r>
+                        <a:t>NR Frequency Inconsistencies</a:t>
+                      </a:r>
+                    </a:p>
+                  </a:txBody>
+                  <a:tcPr>
+                    <a:solidFill>
+                      <a:srgbClr val="F2F6FC"/>
+                    </a:solidFill>
+                  </a:tcPr>
+                </a:tc>
+                <a:tc>
+                  <a:txBody>
+                    <a:bodyPr wrap="square" lIns="25400" rIns="25400" tIns="12700" bIns="12700"/>
+                    <a:lstStyle/>
+                    <a:p>
+                      <a:pPr>
+                        <a:defRPr sz="900">
+                          <a:solidFill>
+                            <a:srgbClr val="282828"/>
+                          </a:solidFill>
+                        </a:defRPr>
+                      </a:pPr>
+                      <a:r>
+                        <a:t>NR nodes with the N77 SSB not in (648672, 647328)</a:t>
+                      </a:r>
+                    </a:p>
+                  </a:txBody>
+                  <a:tcPr>
+                    <a:solidFill>
+                      <a:srgbClr val="F2F6FC"/>
+                    </a:solidFill>
+                  </a:tcPr>
+                </a:tc>
+                <a:tc>
+                  <a:txBody>
+                    <a:bodyPr wrap="square" lIns="25400" rIns="25400" tIns="12700" bIns="12700"/>
+                    <a:lstStyle/>
+                    <a:p>
+                      <a:pPr>
+                        <a:defRPr sz="900">
+                          <a:solidFill>
+                            <a:srgbClr val="282828"/>
+                          </a:solidFill>
+                        </a:defRPr>
+                      </a:pPr>
+                    </a:p>
+                  </a:txBody>
+                  <a:tcPr>
+                    <a:solidFill>
+                      <a:srgbClr val="F2F6FC"/>
+                    </a:solidFill>
+                  </a:tcPr>
+                </a:tc>
+              </a:tr>
+              <a:tr h="505460">
+                <a:tc>
+                  <a:txBody>
+                    <a:bodyPr wrap="square" lIns="25400" rIns="25400" tIns="12700" bIns="12700"/>
+                    <a:lstStyle/>
+                    <a:p>
+                      <a:pPr>
+                        <a:defRPr sz="900">
+                          <a:solidFill>
+                            <a:srgbClr val="282828"/>
+                          </a:solidFill>
+                        </a:defRPr>
+                      </a:pPr>
+                      <a:r>
+                        <a:t>NRFreqRelation</a:t>
+                      </a:r>
+                    </a:p>
+                  </a:txBody>
                   <a:tcPr/>
                 </a:tc>
                 <a:tc>
@@ -10145,7 +10317,7 @@
                         </a:defRPr>
                       </a:pPr>
                       <a:r>
-                        <a:t>NR Frequency Audit</a:t>
+                        <a:t>NR Frequency Inconsistencies</a:t>
                       </a:r>
                     </a:p>
                   </a:txBody>
@@ -10164,7 +10336,7 @@
                         </a:defRPr>
                       </a:pPr>
                       <a:r>
-                        <a:t>NR nodes with the old N77 SSB (648672) but without new N77 SSB (647328)</a:t>
+                        <a:t>NR nodes with Auto-created NRFreqRelationId to new N77 SSB (647328) but not following VZ naming convention (e.g. with extra characters: "auto_647328")</a:t>
                       </a:r>
                     </a:p>
                   </a:txBody>
@@ -10182,9 +10354,6 @@
                           </a:solidFill>
                         </a:defRPr>
                       </a:pPr>
-                      <a:r>
-                        <a:t>Nodes with any relations Step1 pending</a:t>
-                      </a:r>
                     </a:p>
                   </a:txBody>
                   <a:tcPr/>
@@ -10227,7 +10396,7 @@
                         </a:defRPr>
                       </a:pPr>
                       <a:r>
-                        <a:t>NR Frequency Audit</a:t>
+                        <a:t>NR Frequency Inconsistencies</a:t>
                       </a:r>
                     </a:p>
                   </a:txBody>
@@ -10250,7 +10419,7 @@
                         </a:defRPr>
                       </a:pPr>
                       <a:r>
-                        <a:t>NR nodes with the new N77 SSB (647328) NRFreqRelation pointing to mcpcPCellNrFreqRelProfileRef containing new SSB name (cloned) or Other</a:t>
+                        <a:t>NR Nodes with the new N77 SSB (647328) and NRFreqRelation reference to McpcPCellNrFreqRelProfile with old SSB before "_" (648672_xxxx)</a:t>
                       </a:r>
                     </a:p>
                   </a:txBody>
@@ -10273,7 +10442,179 @@
                         </a:defRPr>
                       </a:pPr>
                       <a:r>
-                        <a:t>Nodes with Step1 completed</a:t>
+                        <a:t>Need to review Step2b execution</a:t>
+                      </a:r>
+                    </a:p>
+                  </a:txBody>
+                  <a:tcPr>
+                    <a:solidFill>
+                      <a:srgbClr val="F2F6FC"/>
+                    </a:solidFill>
+                  </a:tcPr>
+                </a:tc>
+              </a:tr>
+              <a:tr h="505460">
+                <a:tc>
+                  <a:txBody>
+                    <a:bodyPr wrap="square" lIns="25400" rIns="25400" tIns="12700" bIns="12700"/>
+                    <a:lstStyle/>
+                    <a:p>
+                      <a:pPr>
+                        <a:defRPr sz="900">
+                          <a:solidFill>
+                            <a:srgbClr val="282828"/>
+                          </a:solidFill>
+                        </a:defRPr>
+                      </a:pPr>
+                      <a:r>
+                        <a:t>NRFreqRelation</a:t>
+                      </a:r>
+                    </a:p>
+                  </a:txBody>
+                  <a:tcPr/>
+                </a:tc>
+                <a:tc>
+                  <a:txBody>
+                    <a:bodyPr wrap="square" lIns="25400" rIns="25400" tIns="12700" bIns="12700"/>
+                    <a:lstStyle/>
+                    <a:p>
+                      <a:pPr>
+                        <a:defRPr sz="900">
+                          <a:solidFill>
+                            <a:srgbClr val="282828"/>
+                          </a:solidFill>
+                        </a:defRPr>
+                      </a:pPr>
+                      <a:r>
+                        <a:t>NR Frequency Inconsistencies</a:t>
+                      </a:r>
+                    </a:p>
+                  </a:txBody>
+                  <a:tcPr/>
+                </a:tc>
+                <a:tc>
+                  <a:txBody>
+                    <a:bodyPr wrap="square" lIns="25400" rIns="25400" tIns="12700" bIns="12700"/>
+                    <a:lstStyle/>
+                    <a:p>
+                      <a:pPr>
+                        <a:defRPr sz="900">
+                          <a:solidFill>
+                            <a:srgbClr val="282828"/>
+                          </a:solidFill>
+                        </a:defRPr>
+                      </a:pPr>
+                      <a:r>
+                        <a:t>NR nodes with the old N77 SSB (648672) and the new SSB (647328) NRFreqRelation pointing to same mcpcPCellNrFreqRelProfileRef containing old SSB name</a:t>
+                      </a:r>
+                    </a:p>
+                  </a:txBody>
+                  <a:tcPr/>
+                </a:tc>
+                <a:tc>
+                  <a:txBody>
+                    <a:bodyPr wrap="square" lIns="25400" rIns="25400" tIns="12700" bIns="12700"/>
+                    <a:lstStyle/>
+                    <a:p>
+                      <a:pPr>
+                        <a:defRPr sz="900">
+                          <a:solidFill>
+                            <a:srgbClr val="282828"/>
+                          </a:solidFill>
+                        </a:defRPr>
+                      </a:pPr>
+                      <a:r>
+                        <a:t>Need to run Step1 on these nodes</a:t>
+                      </a:r>
+                    </a:p>
+                  </a:txBody>
+                  <a:tcPr/>
+                </a:tc>
+              </a:tr>
+              <a:tr h="385445">
+                <a:tc>
+                  <a:txBody>
+                    <a:bodyPr wrap="square" lIns="25400" rIns="25400" tIns="12700" bIns="12700"/>
+                    <a:lstStyle/>
+                    <a:p>
+                      <a:pPr>
+                        <a:defRPr sz="900">
+                          <a:solidFill>
+                            <a:srgbClr val="282828"/>
+                          </a:solidFill>
+                        </a:defRPr>
+                      </a:pPr>
+                      <a:r>
+                        <a:t>NRFreqRelation</a:t>
+                      </a:r>
+                    </a:p>
+                  </a:txBody>
+                  <a:tcPr>
+                    <a:solidFill>
+                      <a:srgbClr val="F2F6FC"/>
+                    </a:solidFill>
+                  </a:tcPr>
+                </a:tc>
+                <a:tc>
+                  <a:txBody>
+                    <a:bodyPr wrap="square" lIns="25400" rIns="25400" tIns="12700" bIns="12700"/>
+                    <a:lstStyle/>
+                    <a:p>
+                      <a:pPr>
+                        <a:defRPr sz="900">
+                          <a:solidFill>
+                            <a:srgbClr val="282828"/>
+                          </a:solidFill>
+                        </a:defRPr>
+                      </a:pPr>
+                      <a:r>
+                        <a:t>NR Frequency Inconsistencies</a:t>
+                      </a:r>
+                    </a:p>
+                  </a:txBody>
+                  <a:tcPr>
+                    <a:solidFill>
+                      <a:srgbClr val="F2F6FC"/>
+                    </a:solidFill>
+                  </a:tcPr>
+                </a:tc>
+                <a:tc>
+                  <a:txBody>
+                    <a:bodyPr wrap="square" lIns="25400" rIns="25400" tIns="12700" bIns="12700"/>
+                    <a:lstStyle/>
+                    <a:p>
+                      <a:pPr>
+                        <a:defRPr sz="900">
+                          <a:solidFill>
+                            <a:srgbClr val="282828"/>
+                          </a:solidFill>
+                        </a:defRPr>
+                      </a:pPr>
+                      <a:r>
+                        <a:t>NR nodes with mismatching params (cell-level) between old N77 SSB (648672) and the new N77 SSB (647328)</a:t>
+                      </a:r>
+                    </a:p>
+                  </a:txBody>
+                  <a:tcPr>
+                    <a:solidFill>
+                      <a:srgbClr val="F2F6FC"/>
+                    </a:solidFill>
+                  </a:tcPr>
+                </a:tc>
+                <a:tc>
+                  <a:txBody>
+                    <a:bodyPr wrap="square" lIns="25400" rIns="25400" tIns="12700" bIns="12700"/>
+                    <a:lstStyle/>
+                    <a:p>
+                      <a:pPr>
+                        <a:defRPr sz="900">
+                          <a:solidFill>
+                            <a:srgbClr val="282828"/>
+                          </a:solidFill>
+                        </a:defRPr>
+                      </a:pPr>
+                      <a:r>
+                        <a:t>Need to review. Step1 run could solve most cases</a:t>
                       </a:r>
                     </a:p>
                   </a:txBody>
@@ -10298,7 +10639,7 @@
                         </a:defRPr>
                       </a:pPr>
                       <a:r>
-                        <a:t>NRFreqRelation</a:t>
+                        <a:t>NRCellRelation</a:t>
                       </a:r>
                     </a:p>
                   </a:txBody>
@@ -10317,7 +10658,7 @@
                         </a:defRPr>
                       </a:pPr>
                       <a:r>
-                        <a:t>NR Frequency Inconsistencies</a:t>
+                        <a:t>NR Frequency Audit</a:t>
                       </a:r>
                     </a:p>
                   </a:txBody>
@@ -10336,7 +10677,7 @@
                         </a:defRPr>
                       </a:pPr>
                       <a:r>
-                        <a:t>NR nodes with the N77 SSB not in (648672, 647328)</a:t>
+                        <a:t>NR cellRelations to old N77 SSB (648672)</a:t>
                       </a:r>
                     </a:p>
                   </a:txBody>
@@ -10354,346 +10695,8 @@
                           </a:solidFill>
                         </a:defRPr>
                       </a:pPr>
-                    </a:p>
-                  </a:txBody>
-                  <a:tcPr/>
-                </a:tc>
-              </a:tr>
-              <a:tr h="505460">
-                <a:tc>
-                  <a:txBody>
-                    <a:bodyPr wrap="square" lIns="25400" rIns="25400" tIns="12700" bIns="12700"/>
-                    <a:lstStyle/>
-                    <a:p>
-                      <a:pPr>
-                        <a:defRPr sz="900">
-                          <a:solidFill>
-                            <a:srgbClr val="282828"/>
-                          </a:solidFill>
-                        </a:defRPr>
-                      </a:pPr>
-                      <a:r>
-                        <a:t>NRFreqRelation</a:t>
-                      </a:r>
-                    </a:p>
-                  </a:txBody>
-                  <a:tcPr>
-                    <a:solidFill>
-                      <a:srgbClr val="F2F6FC"/>
-                    </a:solidFill>
-                  </a:tcPr>
-                </a:tc>
-                <a:tc>
-                  <a:txBody>
-                    <a:bodyPr wrap="square" lIns="25400" rIns="25400" tIns="12700" bIns="12700"/>
-                    <a:lstStyle/>
-                    <a:p>
-                      <a:pPr>
-                        <a:defRPr sz="900">
-                          <a:solidFill>
-                            <a:srgbClr val="282828"/>
-                          </a:solidFill>
-                        </a:defRPr>
-                      </a:pPr>
-                      <a:r>
-                        <a:t>NR Frequency Inconsistencies</a:t>
-                      </a:r>
-                    </a:p>
-                  </a:txBody>
-                  <a:tcPr>
-                    <a:solidFill>
-                      <a:srgbClr val="F2F6FC"/>
-                    </a:solidFill>
-                  </a:tcPr>
-                </a:tc>
-                <a:tc>
-                  <a:txBody>
-                    <a:bodyPr wrap="square" lIns="25400" rIns="25400" tIns="12700" bIns="12700"/>
-                    <a:lstStyle/>
-                    <a:p>
-                      <a:pPr>
-                        <a:defRPr sz="900">
-                          <a:solidFill>
-                            <a:srgbClr val="282828"/>
-                          </a:solidFill>
-                        </a:defRPr>
-                      </a:pPr>
-                      <a:r>
-                        <a:t>NR nodes with Auto-created NRFreqRelationId to new N77 SSB (647328) but not following VZ naming convention (e.g. with extra characters: "auto_647328")</a:t>
-                      </a:r>
-                    </a:p>
-                  </a:txBody>
-                  <a:tcPr>
-                    <a:solidFill>
-                      <a:srgbClr val="F2F6FC"/>
-                    </a:solidFill>
-                  </a:tcPr>
-                </a:tc>
-                <a:tc>
-                  <a:txBody>
-                    <a:bodyPr wrap="square" lIns="25400" rIns="25400" tIns="12700" bIns="12700"/>
-                    <a:lstStyle/>
-                    <a:p>
-                      <a:pPr>
-                        <a:defRPr sz="900">
-                          <a:solidFill>
-                            <a:srgbClr val="282828"/>
-                          </a:solidFill>
-                        </a:defRPr>
-                      </a:pPr>
-                    </a:p>
-                  </a:txBody>
-                  <a:tcPr>
-                    <a:solidFill>
-                      <a:srgbClr val="F2F6FC"/>
-                    </a:solidFill>
-                  </a:tcPr>
-                </a:tc>
-              </a:tr>
-              <a:tr h="385445">
-                <a:tc>
-                  <a:txBody>
-                    <a:bodyPr wrap="square" lIns="25400" rIns="25400" tIns="12700" bIns="12700"/>
-                    <a:lstStyle/>
-                    <a:p>
-                      <a:pPr>
-                        <a:defRPr sz="900">
-                          <a:solidFill>
-                            <a:srgbClr val="282828"/>
-                          </a:solidFill>
-                        </a:defRPr>
-                      </a:pPr>
-                      <a:r>
-                        <a:t>NRFreqRelation</a:t>
-                      </a:r>
-                    </a:p>
-                  </a:txBody>
-                  <a:tcPr/>
-                </a:tc>
-                <a:tc>
-                  <a:txBody>
-                    <a:bodyPr wrap="square" lIns="25400" rIns="25400" tIns="12700" bIns="12700"/>
-                    <a:lstStyle/>
-                    <a:p>
-                      <a:pPr>
-                        <a:defRPr sz="900">
-                          <a:solidFill>
-                            <a:srgbClr val="282828"/>
-                          </a:solidFill>
-                        </a:defRPr>
-                      </a:pPr>
-                      <a:r>
-                        <a:t>NR Frequency Inconsistencies</a:t>
-                      </a:r>
-                    </a:p>
-                  </a:txBody>
-                  <a:tcPr/>
-                </a:tc>
-                <a:tc>
-                  <a:txBody>
-                    <a:bodyPr wrap="square" lIns="25400" rIns="25400" tIns="12700" bIns="12700"/>
-                    <a:lstStyle/>
-                    <a:p>
-                      <a:pPr>
-                        <a:defRPr sz="900">
-                          <a:solidFill>
-                            <a:srgbClr val="282828"/>
-                          </a:solidFill>
-                        </a:defRPr>
-                      </a:pPr>
-                      <a:r>
-                        <a:t>NR Nodes with the new N77 SSB (647328) and NRFreqRelation reference to McpcPCellNrFreqRelProfile with old SSB before "_" (648672_xxxx)</a:t>
-                      </a:r>
-                    </a:p>
-                  </a:txBody>
-                  <a:tcPr/>
-                </a:tc>
-                <a:tc>
-                  <a:txBody>
-                    <a:bodyPr wrap="square" lIns="25400" rIns="25400" tIns="12700" bIns="12700"/>
-                    <a:lstStyle/>
-                    <a:p>
-                      <a:pPr>
-                        <a:defRPr sz="900">
-                          <a:solidFill>
-                            <a:srgbClr val="282828"/>
-                          </a:solidFill>
-                        </a:defRPr>
-                      </a:pPr>
-                      <a:r>
-                        <a:t>Need to review Step2b execution</a:t>
-                      </a:r>
-                    </a:p>
-                  </a:txBody>
-                  <a:tcPr/>
-                </a:tc>
-              </a:tr>
-              <a:tr h="505460">
-                <a:tc>
-                  <a:txBody>
-                    <a:bodyPr wrap="square" lIns="25400" rIns="25400" tIns="12700" bIns="12700"/>
-                    <a:lstStyle/>
-                    <a:p>
-                      <a:pPr>
-                        <a:defRPr sz="900">
-                          <a:solidFill>
-                            <a:srgbClr val="282828"/>
-                          </a:solidFill>
-                        </a:defRPr>
-                      </a:pPr>
-                      <a:r>
-                        <a:t>NRFreqRelation</a:t>
-                      </a:r>
-                    </a:p>
-                  </a:txBody>
-                  <a:tcPr>
-                    <a:solidFill>
-                      <a:srgbClr val="F2F6FC"/>
-                    </a:solidFill>
-                  </a:tcPr>
-                </a:tc>
-                <a:tc>
-                  <a:txBody>
-                    <a:bodyPr wrap="square" lIns="25400" rIns="25400" tIns="12700" bIns="12700"/>
-                    <a:lstStyle/>
-                    <a:p>
-                      <a:pPr>
-                        <a:defRPr sz="900">
-                          <a:solidFill>
-                            <a:srgbClr val="282828"/>
-                          </a:solidFill>
-                        </a:defRPr>
-                      </a:pPr>
-                      <a:r>
-                        <a:t>NR Frequency Inconsistencies</a:t>
-                      </a:r>
-                    </a:p>
-                  </a:txBody>
-                  <a:tcPr>
-                    <a:solidFill>
-                      <a:srgbClr val="F2F6FC"/>
-                    </a:solidFill>
-                  </a:tcPr>
-                </a:tc>
-                <a:tc>
-                  <a:txBody>
-                    <a:bodyPr wrap="square" lIns="25400" rIns="25400" tIns="12700" bIns="12700"/>
-                    <a:lstStyle/>
-                    <a:p>
-                      <a:pPr>
-                        <a:defRPr sz="900">
-                          <a:solidFill>
-                            <a:srgbClr val="282828"/>
-                          </a:solidFill>
-                        </a:defRPr>
-                      </a:pPr>
-                      <a:r>
-                        <a:t>NR nodes with the old N77 SSB (648672) and the new SSB (647328) NRFreqRelation pointing to same mcpcPCellNrFreqRelProfileRef containing old SSB name</a:t>
-                      </a:r>
-                    </a:p>
-                  </a:txBody>
-                  <a:tcPr>
-                    <a:solidFill>
-                      <a:srgbClr val="F2F6FC"/>
-                    </a:solidFill>
-                  </a:tcPr>
-                </a:tc>
-                <a:tc>
-                  <a:txBody>
-                    <a:bodyPr wrap="square" lIns="25400" rIns="25400" tIns="12700" bIns="12700"/>
-                    <a:lstStyle/>
-                    <a:p>
-                      <a:pPr>
-                        <a:defRPr sz="900">
-                          <a:solidFill>
-                            <a:srgbClr val="282828"/>
-                          </a:solidFill>
-                        </a:defRPr>
-                      </a:pPr>
-                      <a:r>
-                        <a:t>Need to run Step1 on these nodes</a:t>
-                      </a:r>
-                    </a:p>
-                  </a:txBody>
-                  <a:tcPr>
-                    <a:solidFill>
-                      <a:srgbClr val="F2F6FC"/>
-                    </a:solidFill>
-                  </a:tcPr>
-                </a:tc>
-              </a:tr>
-              <a:tr h="385445">
-                <a:tc>
-                  <a:txBody>
-                    <a:bodyPr wrap="square" lIns="25400" rIns="25400" tIns="12700" bIns="12700"/>
-                    <a:lstStyle/>
-                    <a:p>
-                      <a:pPr>
-                        <a:defRPr sz="900">
-                          <a:solidFill>
-                            <a:srgbClr val="282828"/>
-                          </a:solidFill>
-                        </a:defRPr>
-                      </a:pPr>
-                      <a:r>
-                        <a:t>NRFreqRelation</a:t>
-                      </a:r>
-                    </a:p>
-                  </a:txBody>
-                  <a:tcPr/>
-                </a:tc>
-                <a:tc>
-                  <a:txBody>
-                    <a:bodyPr wrap="square" lIns="25400" rIns="25400" tIns="12700" bIns="12700"/>
-                    <a:lstStyle/>
-                    <a:p>
-                      <a:pPr>
-                        <a:defRPr sz="900">
-                          <a:solidFill>
-                            <a:srgbClr val="282828"/>
-                          </a:solidFill>
-                        </a:defRPr>
-                      </a:pPr>
-                      <a:r>
-                        <a:t>NR Frequency Inconsistencies</a:t>
-                      </a:r>
-                    </a:p>
-                  </a:txBody>
-                  <a:tcPr/>
-                </a:tc>
-                <a:tc>
-                  <a:txBody>
-                    <a:bodyPr wrap="square" lIns="25400" rIns="25400" tIns="12700" bIns="12700"/>
-                    <a:lstStyle/>
-                    <a:p>
-                      <a:pPr>
-                        <a:defRPr sz="900">
-                          <a:solidFill>
-                            <a:srgbClr val="282828"/>
-                          </a:solidFill>
-                        </a:defRPr>
-                      </a:pPr>
-                      <a:r>
-                        <a:t>NR nodes with mismatching params (cell-level) between old N77 SSB (648672) and the new N77 SSB (647328)</a:t>
-                      </a:r>
-                    </a:p>
-                  </a:txBody>
-                  <a:tcPr/>
-                </a:tc>
-                <a:tc>
-                  <a:txBody>
-                    <a:bodyPr wrap="square" lIns="25400" rIns="25400" tIns="12700" bIns="12700"/>
-                    <a:lstStyle/>
-                    <a:p>
-                      <a:pPr>
-                        <a:defRPr sz="900">
-                          <a:solidFill>
-                            <a:srgbClr val="282828"/>
-                          </a:solidFill>
-                        </a:defRPr>
-                      </a:pPr>
-                      <a:r>
-                        <a:t>Need to review. Step1 run could solve most cases</a:t>
+                      <a:r>
+                        <a:t>Post Step2 some relations pointing to other Mkts could be on old SSB. See details in table</a:t>
                       </a:r>
                     </a:p>
                   </a:txBody>
@@ -10760,7 +10763,7 @@
                         </a:defRPr>
                       </a:pPr>
                       <a:r>
-                        <a:t>NR cellRelations to old N77 SSB (648672)</a:t>
+                        <a:t>NR cellRelations to new N77 SSB (647328)</a:t>
                       </a:r>
                     </a:p>
                   </a:txBody>
@@ -10782,9 +10785,6 @@
                           </a:solidFill>
                         </a:defRPr>
                       </a:pPr>
-                      <a:r>
-                        <a:t>Post Step2 some relations pointing to other Mkts could be on old SSB. See details in table</a:t>
-                      </a:r>
                     </a:p>
                   </a:txBody>
                   <a:tcPr>
@@ -10887,7 +10887,7 @@
         </p:nvGraphicFramePr>
         <p:xfrm>
           <a:off x="457200" y="1706033"/>
-          <a:ext cx="8229600" cy="955040"/>
+          <a:ext cx="8229600" cy="689610"/>
         </p:xfrm>
         <a:graphic>
           <a:graphicData uri="http://schemas.openxmlformats.org/drawingml/2006/table">
@@ -10896,10 +10896,10 @@
                 <a:tableStyleId>{5C22544A-7EE6-4342-B048-85BDC9FD1C3A}</a:tableStyleId>
               </a:tblPr>
               <a:tblGrid>
-                <a:gridCol w="1416238"/>
-                <a:gridCol w="1519945"/>
-                <a:gridCol w="2454146"/>
-                <a:gridCol w="2839271"/>
+                <a:gridCol w="1429155"/>
+                <a:gridCol w="1533807"/>
+                <a:gridCol w="2401472"/>
+                <a:gridCol w="2865166"/>
               </a:tblGrid>
               <a:tr h="158750">
                 <a:tc>
@@ -11009,7 +11009,7 @@
                         </a:defRPr>
                       </a:pPr>
                       <a:r>
-                        <a:t>NRCellRelation</a:t>
+                        <a:t>ExternalNRCellCU</a:t>
                       </a:r>
                     </a:p>
                   </a:txBody>
@@ -11047,7 +11047,7 @@
                         </a:defRPr>
                       </a:pPr>
                       <a:r>
-                        <a:t>NR cellRelations to new N77 SSB (647328)</a:t>
+                        <a:t>External cells to old N77 SSB (648672)</a:t>
                       </a:r>
                     </a:p>
                   </a:txBody>
@@ -11065,6 +11065,9 @@
                           </a:solidFill>
                         </a:defRPr>
                       </a:pPr>
+                      <a:r>
+                        <a:t>PN and DAS might have no External relations defined</a:t>
+                      </a:r>
                     </a:p>
                   </a:txBody>
                   <a:tcPr/>
@@ -11130,7 +11133,7 @@
                         </a:defRPr>
                       </a:pPr>
                       <a:r>
-                        <a:t>External cells to old N77 SSB (648672)</a:t>
+                        <a:t>External cells to new N77 SSB (647328)</a:t>
                       </a:r>
                     </a:p>
                   </a:txBody>
@@ -11162,84 +11165,6 @@
                       <a:srgbClr val="F2F6FC"/>
                     </a:solidFill>
                   </a:tcPr>
-                </a:tc>
-              </a:tr>
-              <a:tr h="265430">
-                <a:tc>
-                  <a:txBody>
-                    <a:bodyPr wrap="square" lIns="25400" rIns="25400" tIns="12700" bIns="12700"/>
-                    <a:lstStyle/>
-                    <a:p>
-                      <a:pPr>
-                        <a:defRPr sz="900">
-                          <a:solidFill>
-                            <a:srgbClr val="282828"/>
-                          </a:solidFill>
-                        </a:defRPr>
-                      </a:pPr>
-                      <a:r>
-                        <a:t>ExternalNRCellCU</a:t>
-                      </a:r>
-                    </a:p>
-                  </a:txBody>
-                  <a:tcPr/>
-                </a:tc>
-                <a:tc>
-                  <a:txBody>
-                    <a:bodyPr wrap="square" lIns="25400" rIns="25400" tIns="12700" bIns="12700"/>
-                    <a:lstStyle/>
-                    <a:p>
-                      <a:pPr>
-                        <a:defRPr sz="900">
-                          <a:solidFill>
-                            <a:srgbClr val="282828"/>
-                          </a:solidFill>
-                        </a:defRPr>
-                      </a:pPr>
-                      <a:r>
-                        <a:t>NR Frequency Audit</a:t>
-                      </a:r>
-                    </a:p>
-                  </a:txBody>
-                  <a:tcPr/>
-                </a:tc>
-                <a:tc>
-                  <a:txBody>
-                    <a:bodyPr wrap="square" lIns="25400" rIns="25400" tIns="12700" bIns="12700"/>
-                    <a:lstStyle/>
-                    <a:p>
-                      <a:pPr>
-                        <a:defRPr sz="900">
-                          <a:solidFill>
-                            <a:srgbClr val="282828"/>
-                          </a:solidFill>
-                        </a:defRPr>
-                      </a:pPr>
-                      <a:r>
-                        <a:t>External cells to new N77 SSB (647328)</a:t>
-                      </a:r>
-                    </a:p>
-                  </a:txBody>
-                  <a:tcPr/>
-                </a:tc>
-                <a:tc>
-                  <a:txBody>
-                    <a:bodyPr wrap="square" lIns="25400" rIns="25400" tIns="12700" bIns="12700"/>
-                    <a:lstStyle/>
-                    <a:p>
-                      <a:pPr>
-                        <a:defRPr sz="900">
-                          <a:solidFill>
-                            <a:srgbClr val="282828"/>
-                          </a:solidFill>
-                        </a:defRPr>
-                      </a:pPr>
-                      <a:r>
-                        <a:t>PN and DAS might have no External relations defined</a:t>
-                      </a:r>
-                    </a:p>
-                  </a:txBody>
-                  <a:tcPr/>
                 </a:tc>
               </a:tr>
             </a:tbl>
@@ -11975,7 +11900,7 @@
                         </a:defRPr>
                       </a:pPr>
                       <a:r>
-                        <a:t>LTE nodes with GUtranFreqRelationId 648672-30-20-0-1 and 647328-30-20-0-1</a:t>
+                        <a:t>LTE nodes with with some cells missing relations to new SSB  (647328)</a:t>
                       </a:r>
                     </a:p>
                   </a:txBody>
@@ -12035,7 +11960,7 @@
                         </a:defRPr>
                       </a:pPr>
                       <a:r>
-                        <a:t>LTE Frequency Audit</a:t>
+                        <a:t>LTE Frequency Inconsistencies</a:t>
                       </a:r>
                     </a:p>
                   </a:txBody>
@@ -12058,7 +11983,7 @@
                         </a:defRPr>
                       </a:pPr>
                       <a:r>
-                        <a:t>LTE nodes with GUtranFreqRelationId 648672-30-20-0-1 but without 647328-30-20-0-1</a:t>
+                        <a:t>LTE nodes with the N77 SSB not in (648672, 647328)</a:t>
                       </a:r>
                     </a:p>
                   </a:txBody>
@@ -12087,6 +12012,256 @@
                       <a:srgbClr val="F2F6FC"/>
                     </a:solidFill>
                   </a:tcPr>
+                </a:tc>
+              </a:tr>
+              <a:tr h="505460">
+                <a:tc>
+                  <a:txBody>
+                    <a:bodyPr wrap="square" lIns="25400" rIns="25400" tIns="12700" bIns="12700"/>
+                    <a:lstStyle/>
+                    <a:p>
+                      <a:pPr>
+                        <a:defRPr sz="900">
+                          <a:solidFill>
+                            <a:srgbClr val="282828"/>
+                          </a:solidFill>
+                        </a:defRPr>
+                      </a:pPr>
+                      <a:r>
+                        <a:t>GUtranFreqRelation</a:t>
+                      </a:r>
+                    </a:p>
+                  </a:txBody>
+                  <a:tcPr/>
+                </a:tc>
+                <a:tc>
+                  <a:txBody>
+                    <a:bodyPr wrap="square" lIns="25400" rIns="25400" tIns="12700" bIns="12700"/>
+                    <a:lstStyle/>
+                    <a:p>
+                      <a:pPr>
+                        <a:defRPr sz="900">
+                          <a:solidFill>
+                            <a:srgbClr val="282828"/>
+                          </a:solidFill>
+                        </a:defRPr>
+                      </a:pPr>
+                      <a:r>
+                        <a:t>LTE Frequency Inconsistencies</a:t>
+                      </a:r>
+                    </a:p>
+                  </a:txBody>
+                  <a:tcPr/>
+                </a:tc>
+                <a:tc>
+                  <a:txBody>
+                    <a:bodyPr wrap="square" lIns="25400" rIns="25400" tIns="12700" bIns="12700"/>
+                    <a:lstStyle/>
+                    <a:p>
+                      <a:pPr>
+                        <a:defRPr sz="900">
+                          <a:solidFill>
+                            <a:srgbClr val="282828"/>
+                          </a:solidFill>
+                        </a:defRPr>
+                      </a:pPr>
+                      <a:r>
+                        <a:t>LTE nodes with Auto-created GUtranFreqRelationId to new N77 SSB (647328) but not following VZ naming convention (647328-30-20-0-1)</a:t>
+                      </a:r>
+                    </a:p>
+                  </a:txBody>
+                  <a:tcPr/>
+                </a:tc>
+                <a:tc>
+                  <a:txBody>
+                    <a:bodyPr wrap="square" lIns="25400" rIns="25400" tIns="12700" bIns="12700"/>
+                    <a:lstStyle/>
+                    <a:p>
+                      <a:pPr>
+                        <a:defRPr sz="900">
+                          <a:solidFill>
+                            <a:srgbClr val="282828"/>
+                          </a:solidFill>
+                        </a:defRPr>
+                      </a:pPr>
+                      <a:r>
+                        <a:t>Not an issue, unless other inconsistencies raised</a:t>
+                      </a:r>
+                    </a:p>
+                  </a:txBody>
+                  <a:tcPr/>
+                </a:tc>
+              </a:tr>
+              <a:tr h="385445">
+                <a:tc>
+                  <a:txBody>
+                    <a:bodyPr wrap="square" lIns="25400" rIns="25400" tIns="12700" bIns="12700"/>
+                    <a:lstStyle/>
+                    <a:p>
+                      <a:pPr>
+                        <a:defRPr sz="900">
+                          <a:solidFill>
+                            <a:srgbClr val="282828"/>
+                          </a:solidFill>
+                        </a:defRPr>
+                      </a:pPr>
+                      <a:r>
+                        <a:t>GUtranFreqRelation</a:t>
+                      </a:r>
+                    </a:p>
+                  </a:txBody>
+                  <a:tcPr>
+                    <a:solidFill>
+                      <a:srgbClr val="F2F6FC"/>
+                    </a:solidFill>
+                  </a:tcPr>
+                </a:tc>
+                <a:tc>
+                  <a:txBody>
+                    <a:bodyPr wrap="square" lIns="25400" rIns="25400" tIns="12700" bIns="12700"/>
+                    <a:lstStyle/>
+                    <a:p>
+                      <a:pPr>
+                        <a:defRPr sz="900">
+                          <a:solidFill>
+                            <a:srgbClr val="282828"/>
+                          </a:solidFill>
+                        </a:defRPr>
+                      </a:pPr>
+                      <a:r>
+                        <a:t>LTE Frequency Inconsistencies</a:t>
+                      </a:r>
+                    </a:p>
+                  </a:txBody>
+                  <a:tcPr>
+                    <a:solidFill>
+                      <a:srgbClr val="F2F6FC"/>
+                    </a:solidFill>
+                  </a:tcPr>
+                </a:tc>
+                <a:tc>
+                  <a:txBody>
+                    <a:bodyPr wrap="square" lIns="25400" rIns="25400" tIns="12700" bIns="12700"/>
+                    <a:lstStyle/>
+                    <a:p>
+                      <a:pPr>
+                        <a:defRPr sz="900">
+                          <a:solidFill>
+                            <a:srgbClr val="282828"/>
+                          </a:solidFill>
+                        </a:defRPr>
+                      </a:pPr>
+                      <a:r>
+                        <a:t>LTE nodes with same endcB1MeasPriority in old N77 SSB (648672) and new N77 SSB (647328)</a:t>
+                      </a:r>
+                    </a:p>
+                  </a:txBody>
+                  <a:tcPr>
+                    <a:solidFill>
+                      <a:srgbClr val="F2F6FC"/>
+                    </a:solidFill>
+                  </a:tcPr>
+                </a:tc>
+                <a:tc>
+                  <a:txBody>
+                    <a:bodyPr wrap="square" lIns="25400" rIns="25400" tIns="12700" bIns="12700"/>
+                    <a:lstStyle/>
+                    <a:p>
+                      <a:pPr>
+                        <a:defRPr sz="900">
+                          <a:solidFill>
+                            <a:srgbClr val="282828"/>
+                          </a:solidFill>
+                        </a:defRPr>
+                      </a:pPr>
+                      <a:r>
+                        <a:t>Need to review and fix with Step1 or Step2c</a:t>
+                      </a:r>
+                    </a:p>
+                  </a:txBody>
+                  <a:tcPr>
+                    <a:solidFill>
+                      <a:srgbClr val="F2F6FC"/>
+                    </a:solidFill>
+                  </a:tcPr>
+                </a:tc>
+              </a:tr>
+              <a:tr h="505460">
+                <a:tc>
+                  <a:txBody>
+                    <a:bodyPr wrap="square" lIns="25400" rIns="25400" tIns="12700" bIns="12700"/>
+                    <a:lstStyle/>
+                    <a:p>
+                      <a:pPr>
+                        <a:defRPr sz="900">
+                          <a:solidFill>
+                            <a:srgbClr val="282828"/>
+                          </a:solidFill>
+                        </a:defRPr>
+                      </a:pPr>
+                      <a:r>
+                        <a:t>GUtranFreqRelation</a:t>
+                      </a:r>
+                    </a:p>
+                  </a:txBody>
+                  <a:tcPr/>
+                </a:tc>
+                <a:tc>
+                  <a:txBody>
+                    <a:bodyPr wrap="square" lIns="25400" rIns="25400" tIns="12700" bIns="12700"/>
+                    <a:lstStyle/>
+                    <a:p>
+                      <a:pPr>
+                        <a:defRPr sz="900">
+                          <a:solidFill>
+                            <a:srgbClr val="282828"/>
+                          </a:solidFill>
+                        </a:defRPr>
+                      </a:pPr>
+                      <a:r>
+                        <a:t>LTE Frequency Inconsistencies</a:t>
+                      </a:r>
+                    </a:p>
+                  </a:txBody>
+                  <a:tcPr/>
+                </a:tc>
+                <a:tc>
+                  <a:txBody>
+                    <a:bodyPr wrap="square" lIns="25400" rIns="25400" tIns="12700" bIns="12700"/>
+                    <a:lstStyle/>
+                    <a:p>
+                      <a:pPr>
+                        <a:defRPr sz="900">
+                          <a:solidFill>
+                            <a:srgbClr val="282828"/>
+                          </a:solidFill>
+                        </a:defRPr>
+                      </a:pPr>
+                      <a:r>
+                        <a:t>LTE nodes with mismatching params between GUtranFreqRelationId 648672 and 647328</a:t>
+                      </a:r>
+                    </a:p>
+                  </a:txBody>
+                  <a:tcPr/>
+                </a:tc>
+                <a:tc>
+                  <a:txBody>
+                    <a:bodyPr wrap="square" lIns="25400" rIns="25400" tIns="12700" bIns="12700"/>
+                    <a:lstStyle/>
+                    <a:p>
+                      <a:pPr>
+                        <a:defRPr sz="900">
+                          <a:solidFill>
+                            <a:srgbClr val="282828"/>
+                          </a:solidFill>
+                        </a:defRPr>
+                      </a:pPr>
+                      <a:r>
+                        <a:t>Parameters qQualMin, qRxLevMin, threshXHigh agreed to set to fixed values on new freqs and inconsistencies should be reported to VZ. Other inconsistent parameters would require review for further actions.</a:t>
+                      </a:r>
+                    </a:p>
+                  </a:txBody>
+                  <a:tcPr/>
                 </a:tc>
               </a:tr>
               <a:tr h="265430">
@@ -12103,82 +12278,7 @@
                         </a:defRPr>
                       </a:pPr>
                       <a:r>
-                        <a:t>GUtranFreqRelation</a:t>
-                      </a:r>
-                    </a:p>
-                  </a:txBody>
-                  <a:tcPr/>
-                </a:tc>
-                <a:tc>
-                  <a:txBody>
-                    <a:bodyPr wrap="square" lIns="25400" rIns="25400" tIns="12700" bIns="12700"/>
-                    <a:lstStyle/>
-                    <a:p>
-                      <a:pPr>
-                        <a:defRPr sz="900">
-                          <a:solidFill>
-                            <a:srgbClr val="282828"/>
-                          </a:solidFill>
-                        </a:defRPr>
-                      </a:pPr>
-                      <a:r>
-                        <a:t>LTE Frequency Inconsistencies</a:t>
-                      </a:r>
-                    </a:p>
-                  </a:txBody>
-                  <a:tcPr/>
-                </a:tc>
-                <a:tc>
-                  <a:txBody>
-                    <a:bodyPr wrap="square" lIns="25400" rIns="25400" tIns="12700" bIns="12700"/>
-                    <a:lstStyle/>
-                    <a:p>
-                      <a:pPr>
-                        <a:defRPr sz="900">
-                          <a:solidFill>
-                            <a:srgbClr val="282828"/>
-                          </a:solidFill>
-                        </a:defRPr>
-                      </a:pPr>
-                      <a:r>
-                        <a:t>LTE nodes with the N77 SSB not in (648672, 647328)</a:t>
-                      </a:r>
-                    </a:p>
-                  </a:txBody>
-                  <a:tcPr/>
-                </a:tc>
-                <a:tc>
-                  <a:txBody>
-                    <a:bodyPr wrap="square" lIns="25400" rIns="25400" tIns="12700" bIns="12700"/>
-                    <a:lstStyle/>
-                    <a:p>
-                      <a:pPr>
-                        <a:defRPr sz="900">
-                          <a:solidFill>
-                            <a:srgbClr val="282828"/>
-                          </a:solidFill>
-                        </a:defRPr>
-                      </a:pPr>
-                    </a:p>
-                  </a:txBody>
-                  <a:tcPr/>
-                </a:tc>
-              </a:tr>
-              <a:tr h="505460">
-                <a:tc>
-                  <a:txBody>
-                    <a:bodyPr wrap="square" lIns="25400" rIns="25400" tIns="12700" bIns="12700"/>
-                    <a:lstStyle/>
-                    <a:p>
-                      <a:pPr>
-                        <a:defRPr sz="900">
-                          <a:solidFill>
-                            <a:srgbClr val="282828"/>
-                          </a:solidFill>
-                        </a:defRPr>
-                      </a:pPr>
-                      <a:r>
-                        <a:t>GUtranFreqRelation</a:t>
+                        <a:t>GUtranCellRelation</a:t>
                       </a:r>
                     </a:p>
                   </a:txBody>
@@ -12201,7 +12301,7 @@
                         </a:defRPr>
                       </a:pPr>
                       <a:r>
-                        <a:t>LTE Frequency Inconsistencies</a:t>
+                        <a:t>LTE Frequency Audit</a:t>
                       </a:r>
                     </a:p>
                   </a:txBody>
@@ -12224,7 +12324,7 @@
                         </a:defRPr>
                       </a:pPr>
                       <a:r>
-                        <a:t>LTE nodes with Auto-created GUtranFreqRelationId to new N77 SSB (647328) but not following VZ naming convention (647328-30-20-0-1)</a:t>
+                        <a:t>LTE cellRelations to old N77 SSB (648672)</a:t>
                       </a:r>
                     </a:p>
                   </a:txBody>
@@ -12246,177 +12346,8 @@
                           </a:solidFill>
                         </a:defRPr>
                       </a:pPr>
-                    </a:p>
-                  </a:txBody>
-                  <a:tcPr>
-                    <a:solidFill>
-                      <a:srgbClr val="F2F6FC"/>
-                    </a:solidFill>
-                  </a:tcPr>
-                </a:tc>
-              </a:tr>
-              <a:tr h="385445">
-                <a:tc>
-                  <a:txBody>
-                    <a:bodyPr wrap="square" lIns="25400" rIns="25400" tIns="12700" bIns="12700"/>
-                    <a:lstStyle/>
-                    <a:p>
-                      <a:pPr>
-                        <a:defRPr sz="900">
-                          <a:solidFill>
-                            <a:srgbClr val="282828"/>
-                          </a:solidFill>
-                        </a:defRPr>
-                      </a:pPr>
-                      <a:r>
-                        <a:t>GUtranFreqRelation</a:t>
-                      </a:r>
-                    </a:p>
-                  </a:txBody>
-                  <a:tcPr/>
-                </a:tc>
-                <a:tc>
-                  <a:txBody>
-                    <a:bodyPr wrap="square" lIns="25400" rIns="25400" tIns="12700" bIns="12700"/>
-                    <a:lstStyle/>
-                    <a:p>
-                      <a:pPr>
-                        <a:defRPr sz="900">
-                          <a:solidFill>
-                            <a:srgbClr val="282828"/>
-                          </a:solidFill>
-                        </a:defRPr>
-                      </a:pPr>
-                      <a:r>
-                        <a:t>LTE Frequency Inconsistencies</a:t>
-                      </a:r>
-                    </a:p>
-                  </a:txBody>
-                  <a:tcPr/>
-                </a:tc>
-                <a:tc>
-                  <a:txBody>
-                    <a:bodyPr wrap="square" lIns="25400" rIns="25400" tIns="12700" bIns="12700"/>
-                    <a:lstStyle/>
-                    <a:p>
-                      <a:pPr>
-                        <a:defRPr sz="900">
-                          <a:solidFill>
-                            <a:srgbClr val="282828"/>
-                          </a:solidFill>
-                        </a:defRPr>
-                      </a:pPr>
-                      <a:r>
-                        <a:t>LTE nodes with same endcB1MeasPriority in old N77 SSB (648672) and new N77 SSB (647328)</a:t>
-                      </a:r>
-                    </a:p>
-                  </a:txBody>
-                  <a:tcPr/>
-                </a:tc>
-                <a:tc>
-                  <a:txBody>
-                    <a:bodyPr wrap="square" lIns="25400" rIns="25400" tIns="12700" bIns="12700"/>
-                    <a:lstStyle/>
-                    <a:p>
-                      <a:pPr>
-                        <a:defRPr sz="900">
-                          <a:solidFill>
-                            <a:srgbClr val="282828"/>
-                          </a:solidFill>
-                        </a:defRPr>
-                      </a:pPr>
-                      <a:r>
-                        <a:t>Need to review and fix with Step1 or Step2c</a:t>
-                      </a:r>
-                    </a:p>
-                  </a:txBody>
-                  <a:tcPr/>
-                </a:tc>
-              </a:tr>
-              <a:tr h="505460">
-                <a:tc>
-                  <a:txBody>
-                    <a:bodyPr wrap="square" lIns="25400" rIns="25400" tIns="12700" bIns="12700"/>
-                    <a:lstStyle/>
-                    <a:p>
-                      <a:pPr>
-                        <a:defRPr sz="900">
-                          <a:solidFill>
-                            <a:srgbClr val="282828"/>
-                          </a:solidFill>
-                        </a:defRPr>
-                      </a:pPr>
-                      <a:r>
-                        <a:t>GUtranFreqRelation</a:t>
-                      </a:r>
-                    </a:p>
-                  </a:txBody>
-                  <a:tcPr>
-                    <a:solidFill>
-                      <a:srgbClr val="F2F6FC"/>
-                    </a:solidFill>
-                  </a:tcPr>
-                </a:tc>
-                <a:tc>
-                  <a:txBody>
-                    <a:bodyPr wrap="square" lIns="25400" rIns="25400" tIns="12700" bIns="12700"/>
-                    <a:lstStyle/>
-                    <a:p>
-                      <a:pPr>
-                        <a:defRPr sz="900">
-                          <a:solidFill>
-                            <a:srgbClr val="282828"/>
-                          </a:solidFill>
-                        </a:defRPr>
-                      </a:pPr>
-                      <a:r>
-                        <a:t>LTE Frequency Inconsistencies</a:t>
-                      </a:r>
-                    </a:p>
-                  </a:txBody>
-                  <a:tcPr>
-                    <a:solidFill>
-                      <a:srgbClr val="F2F6FC"/>
-                    </a:solidFill>
-                  </a:tcPr>
-                </a:tc>
-                <a:tc>
-                  <a:txBody>
-                    <a:bodyPr wrap="square" lIns="25400" rIns="25400" tIns="12700" bIns="12700"/>
-                    <a:lstStyle/>
-                    <a:p>
-                      <a:pPr>
-                        <a:defRPr sz="900">
-                          <a:solidFill>
-                            <a:srgbClr val="282828"/>
-                          </a:solidFill>
-                        </a:defRPr>
-                      </a:pPr>
-                      <a:r>
-                        <a:t>LTE nodes with mismatching params between GUtranFreqRelationId 648672 and 647328</a:t>
-                      </a:r>
-                    </a:p>
-                  </a:txBody>
-                  <a:tcPr>
-                    <a:solidFill>
-                      <a:srgbClr val="F2F6FC"/>
-                    </a:solidFill>
-                  </a:tcPr>
-                </a:tc>
-                <a:tc>
-                  <a:txBody>
-                    <a:bodyPr wrap="square" lIns="25400" rIns="25400" tIns="12700" bIns="12700"/>
-                    <a:lstStyle/>
-                    <a:p>
-                      <a:pPr>
-                        <a:defRPr sz="900">
-                          <a:solidFill>
-                            <a:srgbClr val="282828"/>
-                          </a:solidFill>
-                        </a:defRPr>
-                      </a:pPr>
-                      <a:r>
-                        <a:t>Parameters qQualMin, qRxLevMin, threshXHigh agreed to set to fixed values on new freqs and inconsistencies should be reported to VZ. Other inconsistent parameters would require review for further actions.</a:t>
+                      <a:r>
+                        <a:t>Post Step2 some relations pointing to other Mkts could be on old SSB. See details in table</a:t>
                       </a:r>
                     </a:p>
                   </a:txBody>
@@ -12479,7 +12410,7 @@
                         </a:defRPr>
                       </a:pPr>
                       <a:r>
-                        <a:t>LTE cellRelations to old N77 SSB (648672)</a:t>
+                        <a:t>LTE cellRelations to new N77 SSB (647328)</a:t>
                       </a:r>
                     </a:p>
                   </a:txBody>
@@ -12497,9 +12428,6 @@
                           </a:solidFill>
                         </a:defRPr>
                       </a:pPr>
-                      <a:r>
-                        <a:t>Post Step2 some relations pointing to other Mkts could be on old SSB. See details in table</a:t>
-                      </a:r>
                     </a:p>
                   </a:txBody>
                   <a:tcPr/>
@@ -12519,7 +12447,7 @@
                         </a:defRPr>
                       </a:pPr>
                       <a:r>
-                        <a:t>GUtranCellRelation</a:t>
+                        <a:t>ExternalGUtranCell</a:t>
                       </a:r>
                     </a:p>
                   </a:txBody>
@@ -12565,7 +12493,7 @@
                         </a:defRPr>
                       </a:pPr>
                       <a:r>
-                        <a:t>LTE cellRelations to new N77 SSB (647328)</a:t>
+                        <a:t>External cells to old N77 SSB (648672)</a:t>
                       </a:r>
                     </a:p>
                   </a:txBody>
@@ -12689,7 +12617,7 @@
         </p:nvGraphicFramePr>
         <p:xfrm>
           <a:off x="457200" y="1706033"/>
-          <a:ext cx="8229600" cy="1340485"/>
+          <a:ext cx="8229600" cy="1075055"/>
         </p:xfrm>
         <a:graphic>
           <a:graphicData uri="http://schemas.openxmlformats.org/drawingml/2006/table">
@@ -12849,7 +12777,7 @@
                         </a:defRPr>
                       </a:pPr>
                       <a:r>
-                        <a:t>External cells to old N77 SSB (648672)</a:t>
+                        <a:t>External cells to new N77 SSB (647328)</a:t>
                       </a:r>
                     </a:p>
                   </a:txBody>
@@ -12870,6 +12798,100 @@
                     </a:p>
                   </a:txBody>
                   <a:tcPr/>
+                </a:tc>
+              </a:tr>
+              <a:tr h="385445">
+                <a:tc>
+                  <a:txBody>
+                    <a:bodyPr wrap="square" lIns="25400" rIns="25400" tIns="12700" bIns="12700"/>
+                    <a:lstStyle/>
+                    <a:p>
+                      <a:pPr>
+                        <a:defRPr sz="900">
+                          <a:solidFill>
+                            <a:srgbClr val="282828"/>
+                          </a:solidFill>
+                        </a:defRPr>
+                      </a:pPr>
+                      <a:r>
+                        <a:t>ExternalGUtranCell</a:t>
+                      </a:r>
+                    </a:p>
+                  </a:txBody>
+                  <a:tcPr>
+                    <a:solidFill>
+                      <a:srgbClr val="F2F6FC"/>
+                    </a:solidFill>
+                  </a:tcPr>
+                </a:tc>
+                <a:tc>
+                  <a:txBody>
+                    <a:bodyPr wrap="square" lIns="25400" rIns="25400" tIns="12700" bIns="12700"/>
+                    <a:lstStyle/>
+                    <a:p>
+                      <a:pPr>
+                        <a:defRPr sz="900">
+                          <a:solidFill>
+                            <a:srgbClr val="282828"/>
+                          </a:solidFill>
+                        </a:defRPr>
+                      </a:pPr>
+                      <a:r>
+                        <a:t>LTE Frequency Audit</a:t>
+                      </a:r>
+                    </a:p>
+                  </a:txBody>
+                  <a:tcPr>
+                    <a:solidFill>
+                      <a:srgbClr val="F2F6FC"/>
+                    </a:solidFill>
+                  </a:tcPr>
+                </a:tc>
+                <a:tc>
+                  <a:txBody>
+                    <a:bodyPr wrap="square" lIns="25400" rIns="25400" tIns="12700" bIns="12700"/>
+                    <a:lstStyle/>
+                    <a:p>
+                      <a:pPr>
+                        <a:defRPr sz="900">
+                          <a:solidFill>
+                            <a:srgbClr val="282828"/>
+                          </a:solidFill>
+                        </a:defRPr>
+                      </a:pPr>
+                      <a:r>
+                        <a:t>External cells to old N77 SSB (648672) with serviceStatus=OUT_OF_SERVICE</a:t>
+                      </a:r>
+                    </a:p>
+                  </a:txBody>
+                  <a:tcPr>
+                    <a:solidFill>
+                      <a:srgbClr val="F2F6FC"/>
+                    </a:solidFill>
+                  </a:tcPr>
+                </a:tc>
+                <a:tc>
+                  <a:txBody>
+                    <a:bodyPr wrap="square" lIns="25400" rIns="25400" tIns="12700" bIns="12700"/>
+                    <a:lstStyle/>
+                    <a:p>
+                      <a:pPr>
+                        <a:defRPr sz="900">
+                          <a:solidFill>
+                            <a:srgbClr val="282828"/>
+                          </a:solidFill>
+                        </a:defRPr>
+                      </a:pPr>
+                      <a:r>
+                        <a:t>Externals with unavailable TermPoints are not operational for ENDC and might not be updated immediately after Step2</a:t>
+                      </a:r>
+                    </a:p>
+                  </a:txBody>
+                  <a:tcPr>
+                    <a:solidFill>
+                      <a:srgbClr val="F2F6FC"/>
+                    </a:solidFill>
+                  </a:tcPr>
                 </a:tc>
               </a:tr>
               <a:tr h="265430">
@@ -12890,11 +12912,7 @@
                       </a:r>
                     </a:p>
                   </a:txBody>
-                  <a:tcPr>
-                    <a:solidFill>
-                      <a:srgbClr val="F2F6FC"/>
-                    </a:solidFill>
-                  </a:tcPr>
+                  <a:tcPr/>
                 </a:tc>
                 <a:tc>
                   <a:txBody>
@@ -12913,74 +12931,6 @@
                       </a:r>
                     </a:p>
                   </a:txBody>
-                  <a:tcPr>
-                    <a:solidFill>
-                      <a:srgbClr val="F2F6FC"/>
-                    </a:solidFill>
-                  </a:tcPr>
-                </a:tc>
-                <a:tc>
-                  <a:txBody>
-                    <a:bodyPr wrap="square" lIns="25400" rIns="25400" tIns="12700" bIns="12700"/>
-                    <a:lstStyle/>
-                    <a:p>
-                      <a:pPr>
-                        <a:defRPr sz="900">
-                          <a:solidFill>
-                            <a:srgbClr val="282828"/>
-                          </a:solidFill>
-                        </a:defRPr>
-                      </a:pPr>
-                      <a:r>
-                        <a:t>External cells to new N77 SSB (647328)</a:t>
-                      </a:r>
-                    </a:p>
-                  </a:txBody>
-                  <a:tcPr>
-                    <a:solidFill>
-                      <a:srgbClr val="F2F6FC"/>
-                    </a:solidFill>
-                  </a:tcPr>
-                </a:tc>
-                <a:tc>
-                  <a:txBody>
-                    <a:bodyPr wrap="square" lIns="25400" rIns="25400" tIns="12700" bIns="12700"/>
-                    <a:lstStyle/>
-                    <a:p>
-                      <a:pPr>
-                        <a:defRPr sz="900">
-                          <a:solidFill>
-                            <a:srgbClr val="282828"/>
-                          </a:solidFill>
-                        </a:defRPr>
-                      </a:pPr>
-                    </a:p>
-                  </a:txBody>
-                  <a:tcPr>
-                    <a:solidFill>
-                      <a:srgbClr val="F2F6FC"/>
-                    </a:solidFill>
-                  </a:tcPr>
-                </a:tc>
-              </a:tr>
-              <a:tr h="385445">
-                <a:tc>
-                  <a:txBody>
-                    <a:bodyPr wrap="square" lIns="25400" rIns="25400" tIns="12700" bIns="12700"/>
-                    <a:lstStyle/>
-                    <a:p>
-                      <a:pPr>
-                        <a:defRPr sz="900">
-                          <a:solidFill>
-                            <a:srgbClr val="282828"/>
-                          </a:solidFill>
-                        </a:defRPr>
-                      </a:pPr>
-                      <a:r>
-                        <a:t>ExternalGUtranCell</a:t>
-                      </a:r>
-                    </a:p>
-                  </a:txBody>
                   <a:tcPr/>
                 </a:tc>
                 <a:tc>
@@ -12996,7 +12946,7 @@
                         </a:defRPr>
                       </a:pPr>
                       <a:r>
-                        <a:t>LTE Frequency Audit</a:t>
+                        <a:t>External cells to new N77 SSB (647328) with serviceStatus=OUT_OF_SERVICE</a:t>
                       </a:r>
                     </a:p>
                   </a:txBody>
@@ -13014,122 +12964,9 @@
                           </a:solidFill>
                         </a:defRPr>
                       </a:pPr>
-                      <a:r>
-                        <a:t>External cells to old N77 SSB (648672) with serviceStatus=OUT_OF_SERVICE</a:t>
-                      </a:r>
                     </a:p>
                   </a:txBody>
                   <a:tcPr/>
-                </a:tc>
-                <a:tc>
-                  <a:txBody>
-                    <a:bodyPr wrap="square" lIns="25400" rIns="25400" tIns="12700" bIns="12700"/>
-                    <a:lstStyle/>
-                    <a:p>
-                      <a:pPr>
-                        <a:defRPr sz="900">
-                          <a:solidFill>
-                            <a:srgbClr val="282828"/>
-                          </a:solidFill>
-                        </a:defRPr>
-                      </a:pPr>
-                      <a:r>
-                        <a:t>Externals with unavailable TermPoints are not operational for ENDC and might not be updated immediately after Step2</a:t>
-                      </a:r>
-                    </a:p>
-                  </a:txBody>
-                  <a:tcPr/>
-                </a:tc>
-              </a:tr>
-              <a:tr h="265430">
-                <a:tc>
-                  <a:txBody>
-                    <a:bodyPr wrap="square" lIns="25400" rIns="25400" tIns="12700" bIns="12700"/>
-                    <a:lstStyle/>
-                    <a:p>
-                      <a:pPr>
-                        <a:defRPr sz="900">
-                          <a:solidFill>
-                            <a:srgbClr val="282828"/>
-                          </a:solidFill>
-                        </a:defRPr>
-                      </a:pPr>
-                      <a:r>
-                        <a:t>ExternalGUtranCell</a:t>
-                      </a:r>
-                    </a:p>
-                  </a:txBody>
-                  <a:tcPr>
-                    <a:solidFill>
-                      <a:srgbClr val="F2F6FC"/>
-                    </a:solidFill>
-                  </a:tcPr>
-                </a:tc>
-                <a:tc>
-                  <a:txBody>
-                    <a:bodyPr wrap="square" lIns="25400" rIns="25400" tIns="12700" bIns="12700"/>
-                    <a:lstStyle/>
-                    <a:p>
-                      <a:pPr>
-                        <a:defRPr sz="900">
-                          <a:solidFill>
-                            <a:srgbClr val="282828"/>
-                          </a:solidFill>
-                        </a:defRPr>
-                      </a:pPr>
-                      <a:r>
-                        <a:t>LTE Frequency Audit</a:t>
-                      </a:r>
-                    </a:p>
-                  </a:txBody>
-                  <a:tcPr>
-                    <a:solidFill>
-                      <a:srgbClr val="F2F6FC"/>
-                    </a:solidFill>
-                  </a:tcPr>
-                </a:tc>
-                <a:tc>
-                  <a:txBody>
-                    <a:bodyPr wrap="square" lIns="25400" rIns="25400" tIns="12700" bIns="12700"/>
-                    <a:lstStyle/>
-                    <a:p>
-                      <a:pPr>
-                        <a:defRPr sz="900">
-                          <a:solidFill>
-                            <a:srgbClr val="282828"/>
-                          </a:solidFill>
-                        </a:defRPr>
-                      </a:pPr>
-                      <a:r>
-                        <a:t>External cells to new N77 SSB (647328) with serviceStatus=OUT_OF_SERVICE</a:t>
-                      </a:r>
-                    </a:p>
-                  </a:txBody>
-                  <a:tcPr>
-                    <a:solidFill>
-                      <a:srgbClr val="F2F6FC"/>
-                    </a:solidFill>
-                  </a:tcPr>
-                </a:tc>
-                <a:tc>
-                  <a:txBody>
-                    <a:bodyPr wrap="square" lIns="25400" rIns="25400" tIns="12700" bIns="12700"/>
-                    <a:lstStyle/>
-                    <a:p>
-                      <a:pPr>
-                        <a:defRPr sz="900">
-                          <a:solidFill>
-                            <a:srgbClr val="282828"/>
-                          </a:solidFill>
-                        </a:defRPr>
-                      </a:pPr>
-                    </a:p>
-                  </a:txBody>
-                  <a:tcPr>
-                    <a:solidFill>
-                      <a:srgbClr val="F2F6FC"/>
-                    </a:solidFill>
-                  </a:tcPr>
                 </a:tc>
               </a:tr>
             </a:tbl>

</xml_diff>

<commit_message>
- Updated Technical User Guide to include Naming Convention for Inputs
</commit_message>
<xml_diff>
--- a/help/User-Guide-SSB-Retuning-Automations-v0.7.4.pptx
+++ b/help/User-Guide-SSB-Retuning-Automations-v0.7.4.pptx
@@ -60,6 +60,7 @@
     <p:sldId id="305" r:id="rId61"/>
     <p:sldId id="306" r:id="rId62"/>
     <p:sldId id="307" r:id="rId63"/>
+    <p:sldId id="308" r:id="rId64"/>
   </p:sldIdLst>
   <p:sldSz cx="9144000" cy="6858000" type="screen4x3"/>
   <p:notesSz cx="6858000" cy="9144000"/>
@@ -22890,7 +22891,7 @@
           <a:lstStyle/>
           <a:p>
             <a:r>
-              <a:t>Input requirements and operational best practices</a:t>
+              <a:t>Inputs Naming Convention</a:t>
             </a:r>
           </a:p>
         </p:txBody>
@@ -22924,7 +22925,7 @@
               <a:defRPr sz="1400"/>
             </a:pPr>
             <a:r>
-              <a:t>Recommended naming convention: "&lt;TIMESTAMP&gt;_Step0_&lt;MARKET_ID&gt;_&lt;MARKET_NAME&gt;_&lt;PHASE&gt;"</a:t>
+              <a:t>Recommended naming convention for folders and zips: "&lt;TIMESTAMP&gt;_Step0_&lt;MARKET_ID&gt;_&lt;MARKET_NAME&gt;_&lt;PHASE&gt;"</a:t>
             </a:r>
           </a:p>
           <a:p>
@@ -22933,9 +22934,226 @@
               <a:defRPr sz="1400"/>
             </a:pPr>
             <a:r>
-              <a:t>Example: "20260217_0507_Step0_MKT188_Omaha_PostStep1/20260217_0507_Step0_MKT188_Omaha_PostStep1.zip"</a:t>
-            </a:r>
-          </a:p>
+              <a:t>Example: "20260217_0500_Step0_Mkt188_Omaha_PreStep1/20260217_0500_Step0_Mkt188_Omaha_PreStep1.zip"</a:t>
+            </a:r>
+          </a:p>
+        </p:txBody>
+      </p:sp>
+      <p:graphicFrame>
+        <p:nvGraphicFramePr>
+          <p:cNvPr id="4" name="Table 3"/>
+          <p:cNvGraphicFramePr>
+            <a:graphicFrameLocks noGrp="1"/>
+          </p:cNvGraphicFramePr>
+          <p:nvPr/>
+        </p:nvGraphicFramePr>
+        <p:xfrm>
+          <a:off x="457200" y="3522094"/>
+          <a:ext cx="8229600" cy="582930"/>
+        </p:xfrm>
+        <a:graphic>
+          <a:graphicData uri="http://schemas.openxmlformats.org/drawingml/2006/table">
+            <a:tbl>
+              <a:tblPr firstRow="1" bandRow="1">
+                <a:tableStyleId>{5C22544A-7EE6-4342-B048-85BDC9FD1C3A}</a:tableStyleId>
+              </a:tblPr>
+              <a:tblGrid>
+                <a:gridCol w="2032399"/>
+                <a:gridCol w="6197201"/>
+              </a:tblGrid>
+              <a:tr h="292100">
+                <a:tc>
+                  <a:txBody>
+                    <a:bodyPr wrap="square" lIns="25400" rIns="25400" tIns="12700" bIns="12700"/>
+                    <a:lstStyle/>
+                    <a:p>
+                      <a:pPr>
+                        <a:defRPr b="1" sz="1000">
+                          <a:solidFill>
+                            <a:srgbClr val="FFFFFF"/>
+                          </a:solidFill>
+                        </a:defRPr>
+                      </a:pPr>
+                      <a:r>
+                        <a:t>Naming Convention</a:t>
+                      </a:r>
+                    </a:p>
+                  </a:txBody>
+                  <a:tcPr>
+                    <a:solidFill>
+                      <a:srgbClr val="1F4E79"/>
+                    </a:solidFill>
+                  </a:tcPr>
+                </a:tc>
+                <a:tc>
+                  <a:txBody>
+                    <a:bodyPr wrap="square" lIns="25400" rIns="25400" tIns="12700" bIns="12700"/>
+                    <a:lstStyle/>
+                    <a:p>
+                      <a:pPr>
+                        <a:defRPr b="1" sz="1000">
+                          <a:solidFill>
+                            <a:srgbClr val="FFFFFF"/>
+                          </a:solidFill>
+                        </a:defRPr>
+                      </a:pPr>
+                      <a:r>
+                        <a:t>"&lt;TIMESTAMP&gt;_Step0_&lt;MARKET_ID&gt;_&lt;MARKET_NAME&gt;_&lt;PHASE&gt;/&lt;TIMESTAMP&gt;_Step0_&lt;MARKET_ID&gt;_&lt;MARKET_NAME&gt;_&lt;PHASE&gt;.zip"</a:t>
+                      </a:r>
+                    </a:p>
+                  </a:txBody>
+                  <a:tcPr>
+                    <a:solidFill>
+                      <a:srgbClr val="1F4E79"/>
+                    </a:solidFill>
+                  </a:tcPr>
+                </a:tc>
+              </a:tr>
+              <a:tr h="145415">
+                <a:tc>
+                  <a:txBody>
+                    <a:bodyPr wrap="square" lIns="25400" rIns="25400" tIns="12700" bIns="12700"/>
+                    <a:lstStyle/>
+                    <a:p>
+                      <a:pPr>
+                        <a:defRPr sz="900">
+                          <a:solidFill>
+                            <a:srgbClr val="282828"/>
+                          </a:solidFill>
+                        </a:defRPr>
+                      </a:pPr>
+                      <a:r>
+                        <a:t>Example PreStep1</a:t>
+                      </a:r>
+                    </a:p>
+                  </a:txBody>
+                  <a:tcPr/>
+                </a:tc>
+                <a:tc>
+                  <a:txBody>
+                    <a:bodyPr wrap="square" lIns="25400" rIns="25400" tIns="12700" bIns="12700"/>
+                    <a:lstStyle/>
+                    <a:p>
+                      <a:pPr>
+                        <a:defRPr sz="900">
+                          <a:solidFill>
+                            <a:srgbClr val="282828"/>
+                          </a:solidFill>
+                        </a:defRPr>
+                      </a:pPr>
+                      <a:r>
+                        <a:t>"20260217_0500_Step0_Mkt188_Omaha_PreStep1/20260217_0500_Step0_Mkt188_Omaha_PreStep1.zip"</a:t>
+                      </a:r>
+                    </a:p>
+                  </a:txBody>
+                  <a:tcPr/>
+                </a:tc>
+              </a:tr>
+              <a:tr h="145415">
+                <a:tc>
+                  <a:txBody>
+                    <a:bodyPr wrap="square" lIns="25400" rIns="25400" tIns="12700" bIns="12700"/>
+                    <a:lstStyle/>
+                    <a:p>
+                      <a:pPr>
+                        <a:defRPr sz="900">
+                          <a:solidFill>
+                            <a:srgbClr val="282828"/>
+                          </a:solidFill>
+                        </a:defRPr>
+                      </a:pPr>
+                      <a:r>
+                        <a:t>Example PostStep1</a:t>
+                      </a:r>
+                    </a:p>
+                  </a:txBody>
+                  <a:tcPr>
+                    <a:solidFill>
+                      <a:srgbClr val="F2F6FC"/>
+                    </a:solidFill>
+                  </a:tcPr>
+                </a:tc>
+                <a:tc>
+                  <a:txBody>
+                    <a:bodyPr wrap="square" lIns="25400" rIns="25400" tIns="12700" bIns="12700"/>
+                    <a:lstStyle/>
+                    <a:p>
+                      <a:pPr>
+                        <a:defRPr sz="900">
+                          <a:solidFill>
+                            <a:srgbClr val="282828"/>
+                          </a:solidFill>
+                        </a:defRPr>
+                      </a:pPr>
+                      <a:r>
+                        <a:t>"20260217_0630_Step0_Mkt188_Omaha_PostStep1/20260217_0630_Step0_Mkt188_Omaha_PostStep1.zip"</a:t>
+                      </a:r>
+                    </a:p>
+                  </a:txBody>
+                  <a:tcPr>
+                    <a:solidFill>
+                      <a:srgbClr val="F2F6FC"/>
+                    </a:solidFill>
+                  </a:tcPr>
+                </a:tc>
+              </a:tr>
+            </a:tbl>
+          </a:graphicData>
+        </a:graphic>
+      </p:graphicFrame>
+    </p:spTree>
+  </p:cSld>
+  <p:clrMapOvr>
+    <a:masterClrMapping/>
+  </p:clrMapOvr>
+</p:sld>
+</file>
+
+<file path=ppt/slides/slide52.xml><?xml version="1.0" encoding="utf-8"?>
+<p:sld xmlns:a="http://schemas.openxmlformats.org/drawingml/2006/main" xmlns:p="http://schemas.openxmlformats.org/presentationml/2006/main" xmlns:r="http://schemas.openxmlformats.org/officeDocument/2006/relationships">
+  <p:cSld>
+    <p:spTree>
+      <p:nvGrpSpPr>
+        <p:cNvPr id="1" name=""/>
+        <p:cNvGrpSpPr/>
+        <p:nvPr/>
+      </p:nvGrpSpPr>
+      <p:grpSpPr/>
+      <p:sp>
+        <p:nvSpPr>
+          <p:cNvPr id="2" name="Title 1"/>
+          <p:cNvSpPr>
+            <a:spLocks noGrp="1"/>
+          </p:cNvSpPr>
+          <p:nvPr>
+            <p:ph type="title"/>
+          </p:nvPr>
+        </p:nvSpPr>
+        <p:spPr/>
+        <p:txBody>
+          <a:bodyPr/>
+          <a:lstStyle/>
+          <a:p>
+            <a:r>
+              <a:t>Operational Best Practices</a:t>
+            </a:r>
+          </a:p>
+        </p:txBody>
+      </p:sp>
+      <p:sp>
+        <p:nvSpPr>
+          <p:cNvPr id="3" name="Content Placeholder 2"/>
+          <p:cNvSpPr>
+            <a:spLocks noGrp="1"/>
+          </p:cNvSpPr>
+          <p:nvPr>
+            <p:ph idx="1"/>
+          </p:nvPr>
+        </p:nvSpPr>
+        <p:spPr/>
+        <p:txBody>
+          <a:bodyPr/>
+          <a:lstStyle/>
           <a:p>
             <a:pPr lvl="1">
               <a:buChar char="•"/>
@@ -23009,7 +23227,7 @@
 </p:sld>
 </file>
 
-<file path=ppt/slides/slide52.xml><?xml version="1.0" encoding="utf-8"?>
+<file path=ppt/slides/slide53.xml><?xml version="1.0" encoding="utf-8"?>
 <p:sld xmlns:a="http://schemas.openxmlformats.org/drawingml/2006/main" xmlns:p="http://schemas.openxmlformats.org/presentationml/2006/main" xmlns:r="http://schemas.openxmlformats.org/officeDocument/2006/relationships">
   <p:cSld>
     <p:spTree>

</xml_diff>